<commit_message>
Expand on classes and OO lesson.
</commit_message>
<xml_diff>
--- a/18-Design and Classes/18-Design and Classes.pptx
+++ b/18-Design and Classes/18-Design and Classes.pptx
@@ -5,24 +5,28 @@
     <p:sldMasterId id="2147483649" r:id="rId1"/>
   </p:sldMasterIdLst>
   <p:notesMasterIdLst>
-    <p:notesMasterId r:id="rId14"/>
+    <p:notesMasterId r:id="rId18"/>
   </p:notesMasterIdLst>
   <p:handoutMasterIdLst>
-    <p:handoutMasterId r:id="rId15"/>
+    <p:handoutMasterId r:id="rId19"/>
   </p:handoutMasterIdLst>
   <p:sldIdLst>
     <p:sldId id="256" r:id="rId2"/>
-    <p:sldId id="257" r:id="rId3"/>
-    <p:sldId id="266" r:id="rId4"/>
-    <p:sldId id="261" r:id="rId5"/>
-    <p:sldId id="262" r:id="rId6"/>
-    <p:sldId id="263" r:id="rId7"/>
-    <p:sldId id="264" r:id="rId8"/>
-    <p:sldId id="265" r:id="rId9"/>
-    <p:sldId id="267" r:id="rId10"/>
+    <p:sldId id="271" r:id="rId3"/>
+    <p:sldId id="257" r:id="rId4"/>
+    <p:sldId id="266" r:id="rId5"/>
+    <p:sldId id="261" r:id="rId6"/>
+    <p:sldId id="262" r:id="rId7"/>
+    <p:sldId id="263" r:id="rId8"/>
+    <p:sldId id="264" r:id="rId9"/>
+    <p:sldId id="265" r:id="rId10"/>
     <p:sldId id="269" r:id="rId11"/>
-    <p:sldId id="258" r:id="rId12"/>
-    <p:sldId id="259" r:id="rId13"/>
+    <p:sldId id="272" r:id="rId12"/>
+    <p:sldId id="273" r:id="rId13"/>
+    <p:sldId id="274" r:id="rId14"/>
+    <p:sldId id="267" r:id="rId15"/>
+    <p:sldId id="258" r:id="rId16"/>
+    <p:sldId id="259" r:id="rId17"/>
   </p:sldIdLst>
   <p:sldSz cx="9144000" cy="6858000" type="screen4x3"/>
   <p:notesSz cx="7099300" cy="10234613"/>
@@ -474,7 +478,7 @@
             <a:fld id="{B1986778-4955-48BF-B9A5-723767A6F1B2}" type="datetimeFigureOut">
               <a:rPr lang="en-US" smtClean="0"/>
               <a:pPr/>
-              <a:t>3/20/2017</a:t>
+              <a:t>3/26/2018</a:t>
             </a:fld>
             <a:endParaRPr lang="en-GB" dirty="0"/>
           </a:p>
@@ -943,7 +947,7 @@
             <a:fld id="{2CD5F562-2E1C-4DA3-A11B-1F54CBDD21A0}" type="slidenum">
               <a:rPr lang="en-US" smtClean="0"/>
               <a:pPr/>
-              <a:t>6</a:t>
+              <a:t>7</a:t>
             </a:fld>
             <a:endParaRPr lang="en-US" dirty="0"/>
           </a:p>
@@ -1064,7 +1068,7 @@
             <a:fld id="{2CD5F562-2E1C-4DA3-A11B-1F54CBDD21A0}" type="slidenum">
               <a:rPr lang="en-US" smtClean="0"/>
               <a:pPr/>
-              <a:t>7</a:t>
+              <a:t>8</a:t>
             </a:fld>
             <a:endParaRPr lang="en-US" dirty="0"/>
           </a:p>
@@ -4415,181 +4419,7 @@
             </a:r>
             <a:r>
               <a:rPr lang="en-GB" dirty="0"/>
-              <a:t> 					CE599-002 Spring 2017</a:t>
-            </a:r>
-          </a:p>
-        </p:txBody>
-      </p:sp>
-      <p:sp>
-        <p:nvSpPr>
-          <p:cNvPr id="12" name="Title 1"/>
-          <p:cNvSpPr txBox="1">
-            <a:spLocks/>
-          </p:cNvSpPr>
-          <p:nvPr/>
-        </p:nvSpPr>
-        <p:spPr bwMode="auto">
-          <a:xfrm>
-            <a:off x="7137285" y="683695"/>
-            <a:ext cx="1931479" cy="436662"/>
-          </a:xfrm>
-          <a:prstGeom prst="rect">
-            <a:avLst/>
-          </a:prstGeom>
-          <a:noFill/>
-          <a:ln w="9525">
-            <a:noFill/>
-            <a:miter lim="800000"/>
-            <a:headEnd/>
-            <a:tailEnd/>
-          </a:ln>
-          <a:effectLst/>
-        </p:spPr>
-        <p:txBody>
-          <a:bodyPr vert="horz" wrap="square" lIns="91440" tIns="45720" rIns="91440" bIns="45720" numCol="1" anchor="t" anchorCtr="0" compatLnSpc="1">
-            <a:prstTxWarp prst="textNoShape">
-              <a:avLst/>
-            </a:prstTxWarp>
-          </a:bodyPr>
-          <a:lstStyle>
-            <a:lvl1pPr algn="l" rtl="0" fontAlgn="base">
-              <a:spcBef>
-                <a:spcPct val="0"/>
-              </a:spcBef>
-              <a:spcAft>
-                <a:spcPct val="0"/>
-              </a:spcAft>
-              <a:defRPr sz="3200" b="1">
-                <a:solidFill>
-                  <a:schemeClr val="tx2"/>
-                </a:solidFill>
-                <a:latin typeface="+mj-lt"/>
-                <a:ea typeface="+mj-ea"/>
-                <a:cs typeface="+mj-cs"/>
-              </a:defRPr>
-            </a:lvl1pPr>
-            <a:lvl2pPr algn="l" rtl="0" fontAlgn="base">
-              <a:spcBef>
-                <a:spcPct val="0"/>
-              </a:spcBef>
-              <a:spcAft>
-                <a:spcPct val="0"/>
-              </a:spcAft>
-              <a:defRPr sz="3000" b="1">
-                <a:solidFill>
-                  <a:schemeClr val="tx2"/>
-                </a:solidFill>
-                <a:latin typeface="Arial" charset="0"/>
-              </a:defRPr>
-            </a:lvl2pPr>
-            <a:lvl3pPr algn="l" rtl="0" fontAlgn="base">
-              <a:spcBef>
-                <a:spcPct val="0"/>
-              </a:spcBef>
-              <a:spcAft>
-                <a:spcPct val="0"/>
-              </a:spcAft>
-              <a:defRPr sz="3000" b="1">
-                <a:solidFill>
-                  <a:schemeClr val="tx2"/>
-                </a:solidFill>
-                <a:latin typeface="Arial" charset="0"/>
-              </a:defRPr>
-            </a:lvl3pPr>
-            <a:lvl4pPr algn="l" rtl="0" fontAlgn="base">
-              <a:spcBef>
-                <a:spcPct val="0"/>
-              </a:spcBef>
-              <a:spcAft>
-                <a:spcPct val="0"/>
-              </a:spcAft>
-              <a:defRPr sz="3000" b="1">
-                <a:solidFill>
-                  <a:schemeClr val="tx2"/>
-                </a:solidFill>
-                <a:latin typeface="Arial" charset="0"/>
-              </a:defRPr>
-            </a:lvl4pPr>
-            <a:lvl5pPr algn="l" rtl="0" fontAlgn="base">
-              <a:spcBef>
-                <a:spcPct val="0"/>
-              </a:spcBef>
-              <a:spcAft>
-                <a:spcPct val="0"/>
-              </a:spcAft>
-              <a:defRPr sz="3000" b="1">
-                <a:solidFill>
-                  <a:schemeClr val="tx2"/>
-                </a:solidFill>
-                <a:latin typeface="Arial" charset="0"/>
-              </a:defRPr>
-            </a:lvl5pPr>
-            <a:lvl6pPr marL="457200" algn="l" rtl="0" fontAlgn="base">
-              <a:spcBef>
-                <a:spcPct val="0"/>
-              </a:spcBef>
-              <a:spcAft>
-                <a:spcPct val="0"/>
-              </a:spcAft>
-              <a:defRPr sz="3000" b="1">
-                <a:solidFill>
-                  <a:schemeClr val="tx2"/>
-                </a:solidFill>
-                <a:latin typeface="Arial" charset="0"/>
-              </a:defRPr>
-            </a:lvl6pPr>
-            <a:lvl7pPr marL="914400" algn="l" rtl="0" fontAlgn="base">
-              <a:spcBef>
-                <a:spcPct val="0"/>
-              </a:spcBef>
-              <a:spcAft>
-                <a:spcPct val="0"/>
-              </a:spcAft>
-              <a:defRPr sz="3000" b="1">
-                <a:solidFill>
-                  <a:schemeClr val="tx2"/>
-                </a:solidFill>
-                <a:latin typeface="Arial" charset="0"/>
-              </a:defRPr>
-            </a:lvl7pPr>
-            <a:lvl8pPr marL="1371600" algn="l" rtl="0" fontAlgn="base">
-              <a:spcBef>
-                <a:spcPct val="0"/>
-              </a:spcBef>
-              <a:spcAft>
-                <a:spcPct val="0"/>
-              </a:spcAft>
-              <a:defRPr sz="3000" b="1">
-                <a:solidFill>
-                  <a:schemeClr val="tx2"/>
-                </a:solidFill>
-                <a:latin typeface="Arial" charset="0"/>
-              </a:defRPr>
-            </a:lvl8pPr>
-            <a:lvl9pPr marL="1828800" algn="l" rtl="0" fontAlgn="base">
-              <a:spcBef>
-                <a:spcPct val="0"/>
-              </a:spcBef>
-              <a:spcAft>
-                <a:spcPct val="0"/>
-              </a:spcAft>
-              <a:defRPr sz="3000" b="1">
-                <a:solidFill>
-                  <a:schemeClr val="tx2"/>
-                </a:solidFill>
-                <a:latin typeface="Arial" charset="0"/>
-              </a:defRPr>
-            </a:lvl9pPr>
-          </a:lstStyle>
-          <a:p>
-            <a:pPr algn="r"/>
-            <a:r>
-              <a:rPr lang="en-GB" sz="2000" kern="0" dirty="0">
-                <a:solidFill>
-                  <a:schemeClr val="bg1"/>
-                </a:solidFill>
-              </a:rPr>
-              <a:t>21 March 2017</a:t>
+              <a:t> 					CE599-002</a:t>
             </a:r>
           </a:p>
         </p:txBody>
@@ -4666,24 +4496,8 @@
             </a:pPr>
             <a:r>
               <a:rPr lang="en-US" dirty="0"/>
-              <a:t>In: </a:t>
-            </a:r>
-          </a:p>
-          <a:p>
-            <a:pPr marL="0" indent="0">
-              <a:buNone/>
-            </a:pPr>
-            <a:endParaRPr lang="en-US" dirty="0"/>
-          </a:p>
-          <a:p>
-            <a:pPr marL="0" indent="0">
-              <a:buNone/>
-            </a:pPr>
-            <a:r>
-              <a:rPr lang="en-US" dirty="0"/>
-              <a:t>18-Design and Classes</a:t>
-            </a:r>
-            <a:endParaRPr lang="en-US" dirty="0"/>
+              <a:t>Road.py</a:t>
+            </a:r>
           </a:p>
         </p:txBody>
       </p:sp>
@@ -4759,7 +4573,7 @@
           <a:p>
             <a:r>
               <a:rPr lang="en-US" dirty="0"/>
-              <a:t>Homework</a:t>
+              <a:t>Running at a command prompt</a:t>
             </a:r>
           </a:p>
         </p:txBody>
@@ -4782,47 +4596,100 @@
             <a:pPr marL="0" indent="0">
               <a:buNone/>
             </a:pPr>
-            <a:r>
-              <a:rPr lang="en-US" sz="2400" dirty="0"/>
-              <a:t>1. Read (and understand) chapters 14, 15 and 16 of Think Python: </a:t>
-            </a:r>
+            <a:endParaRPr lang="en-US" dirty="0">
+              <a:cs typeface="Courier New" panose="02070309020205020404" pitchFamily="49" charset="0"/>
+            </a:endParaRPr>
           </a:p>
           <a:p>
             <a:pPr marL="0" indent="0">
               <a:buNone/>
             </a:pPr>
             <a:r>
-              <a:rPr lang="en-US" sz="2400" dirty="0"/>
-              <a:t>	</a:t>
-            </a:r>
-            <a:r>
-              <a:rPr lang="en-US" sz="2400" dirty="0">
-                <a:hlinkClick r:id="rId2"/>
+              <a:rPr lang="en-US" dirty="0">
+                <a:cs typeface="Courier New" panose="02070309020205020404" pitchFamily="49" charset="0"/>
               </a:rPr>
-              <a:t>http://greenteapress.com/thinkpython/thinkpython.pdf</a:t>
-            </a:r>
-            <a:endParaRPr lang="en-US" sz="2400" dirty="0"/>
+              <a:t>Running a script: </a:t>
+            </a:r>
           </a:p>
           <a:p>
             <a:pPr marL="0" indent="0">
               <a:buNone/>
             </a:pPr>
-            <a:endParaRPr lang="en-US" sz="2400" dirty="0"/>
+            <a:r>
+              <a:rPr lang="en-US" dirty="0">
+                <a:latin typeface="Courier New" panose="02070309020205020404" pitchFamily="49" charset="0"/>
+                <a:cs typeface="Courier New" panose="02070309020205020404" pitchFamily="49" charset="0"/>
+              </a:rPr>
+              <a:t>python &lt;</a:t>
+            </a:r>
+            <a:r>
+              <a:rPr lang="en-US" dirty="0" err="1">
+                <a:latin typeface="Courier New" panose="02070309020205020404" pitchFamily="49" charset="0"/>
+                <a:cs typeface="Courier New" panose="02070309020205020404" pitchFamily="49" charset="0"/>
+              </a:rPr>
+              <a:t>script_name</a:t>
+            </a:r>
+            <a:r>
+              <a:rPr lang="en-US" dirty="0">
+                <a:latin typeface="Courier New" panose="02070309020205020404" pitchFamily="49" charset="0"/>
+                <a:cs typeface="Courier New" panose="02070309020205020404" pitchFamily="49" charset="0"/>
+              </a:rPr>
+              <a:t>&gt;</a:t>
+            </a:r>
           </a:p>
           <a:p>
             <a:pPr marL="0" indent="0">
               <a:buNone/>
             </a:pPr>
-            <a:r>
-              <a:rPr lang="en-US" sz="2400" dirty="0"/>
-              <a:t>2. Do the exercise on the next page. You can test your solution in a notebook, but should implement the final solution in scripts. </a:t>
-            </a:r>
+            <a:endParaRPr lang="en-US" dirty="0"/>
           </a:p>
           <a:p>
             <a:pPr marL="0" indent="0">
               <a:buNone/>
             </a:pPr>
-            <a:endParaRPr lang="en-US" sz="2400" dirty="0"/>
+            <a:r>
+              <a:rPr lang="en-US" dirty="0"/>
+              <a:t>i.e. </a:t>
+            </a:r>
+          </a:p>
+          <a:p>
+            <a:pPr marL="0" indent="0">
+              <a:buNone/>
+            </a:pPr>
+            <a:r>
+              <a:rPr lang="en-US" dirty="0">
+                <a:latin typeface="Courier New" panose="02070309020205020404" pitchFamily="49" charset="0"/>
+                <a:cs typeface="Courier New" panose="02070309020205020404" pitchFamily="49" charset="0"/>
+              </a:rPr>
+              <a:t>python build_road.py</a:t>
+            </a:r>
+          </a:p>
+          <a:p>
+            <a:pPr marL="0" indent="0">
+              <a:buNone/>
+            </a:pPr>
+            <a:endParaRPr lang="en-US" dirty="0">
+              <a:latin typeface="Courier New" panose="02070309020205020404" pitchFamily="49" charset="0"/>
+              <a:cs typeface="Courier New" panose="02070309020205020404" pitchFamily="49" charset="0"/>
+            </a:endParaRPr>
+          </a:p>
+          <a:p>
+            <a:pPr marL="0" indent="0">
+              <a:buNone/>
+            </a:pPr>
+            <a:endParaRPr lang="en-US" dirty="0">
+              <a:latin typeface="Courier New" panose="02070309020205020404" pitchFamily="49" charset="0"/>
+              <a:cs typeface="Courier New" panose="02070309020205020404" pitchFamily="49" charset="0"/>
+            </a:endParaRPr>
+          </a:p>
+          <a:p>
+            <a:pPr marL="0" indent="0">
+              <a:buNone/>
+            </a:pPr>
+            <a:endParaRPr lang="en-US" dirty="0">
+              <a:latin typeface="Courier New" panose="02070309020205020404" pitchFamily="49" charset="0"/>
+              <a:cs typeface="Courier New" panose="02070309020205020404" pitchFamily="49" charset="0"/>
+            </a:endParaRPr>
           </a:p>
         </p:txBody>
       </p:sp>
@@ -4854,7 +4721,7 @@
     </p:spTree>
     <p:extLst>
       <p:ext uri="{BB962C8B-B14F-4D97-AF65-F5344CB8AC3E}">
-        <p14:creationId xmlns:p14="http://schemas.microsoft.com/office/powerpoint/2010/main" val="3924181066"/>
+        <p14:creationId xmlns:p14="http://schemas.microsoft.com/office/powerpoint/2010/main" val="3007645993"/>
       </p:ext>
     </p:extLst>
   </p:cSld>
@@ -4898,7 +4765,7 @@
           <a:p>
             <a:r>
               <a:rPr lang="en-US" dirty="0"/>
-              <a:t>Homework</a:t>
+              <a:t>Running at a command prompt</a:t>
             </a:r>
           </a:p>
         </p:txBody>
@@ -4918,95 +4785,80 @@
           <a:bodyPr/>
           <a:lstStyle/>
           <a:p>
-            <a:pPr marL="457200" indent="-457200">
-              <a:buAutoNum type="arabicPeriod"/>
+            <a:pPr marL="0" indent="0">
+              <a:buNone/>
             </a:pPr>
-            <a:r>
-              <a:rPr lang="en-US" sz="2400" dirty="0"/>
-              <a:t>Create a class called car, with the attributes: color, location (x, y coordinates), and direction.  </a:t>
-            </a:r>
-          </a:p>
-          <a:p>
-            <a:pPr marL="457200" indent="-457200">
-              <a:buAutoNum type="arabicPeriod"/>
+            <a:endParaRPr lang="en-US" dirty="0"/>
+          </a:p>
+          <a:p>
+            <a:pPr marL="0" indent="0">
+              <a:buNone/>
             </a:pPr>
             <a:r>
-              <a:rPr lang="en-US" sz="2400" dirty="0"/>
-              <a:t>Write methods for: go(), </a:t>
-            </a:r>
-            <a:r>
-              <a:rPr lang="en-US" sz="2400" dirty="0" err="1"/>
-              <a:t>turn_left</a:t>
-            </a:r>
-            <a:r>
-              <a:rPr lang="en-US" sz="2400" dirty="0"/>
-              <a:t>(), and </a:t>
-            </a:r>
-            <a:r>
-              <a:rPr lang="en-US" sz="2400" dirty="0" err="1"/>
-              <a:t>turn_right</a:t>
-            </a:r>
-            <a:r>
-              <a:rPr lang="en-US" sz="2400" dirty="0"/>
-              <a:t>(). </a:t>
-            </a:r>
-          </a:p>
-          <a:p>
-            <a:pPr marL="457200" indent="-457200">
-              <a:buAutoNum type="arabicPeriod"/>
+              <a:rPr lang="en-US" dirty="0"/>
+              <a:t>Execution starts at: </a:t>
+            </a:r>
+          </a:p>
+          <a:p>
+            <a:pPr marL="0" indent="0">
+              <a:buNone/>
             </a:pPr>
-            <a:r>
-              <a:rPr lang="en-US" sz="2400" dirty="0"/>
-              <a:t>Add a print() method that prints the current attributes of the car. </a:t>
-            </a:r>
-          </a:p>
-          <a:p>
-            <a:pPr marL="457200" indent="-457200">
-              <a:buAutoNum type="arabicPeriod"/>
+            <a:endParaRPr lang="en-US" dirty="0">
+              <a:latin typeface="Courier New" panose="02070309020205020404" pitchFamily="49" charset="0"/>
+              <a:cs typeface="Courier New" panose="02070309020205020404" pitchFamily="49" charset="0"/>
+            </a:endParaRPr>
+          </a:p>
+          <a:p>
+            <a:pPr marL="0" indent="0">
+              <a:buNone/>
             </a:pPr>
             <a:r>
-              <a:rPr lang="en-US" sz="2400" dirty="0"/>
-              <a:t>Write a script to: </a:t>
-            </a:r>
-          </a:p>
-          <a:p>
-            <a:pPr marL="857250" lvl="1" indent="-457200">
-              <a:buAutoNum type="arabicPeriod"/>
+              <a:rPr lang="en-US" dirty="0">
+                <a:latin typeface="Courier New" panose="02070309020205020404" pitchFamily="49" charset="0"/>
+                <a:cs typeface="Courier New" panose="02070309020205020404" pitchFamily="49" charset="0"/>
+              </a:rPr>
+              <a:t>if __name__ == '__main__’:</a:t>
+            </a:r>
+            <a:endParaRPr lang="en-US" dirty="0"/>
+          </a:p>
+          <a:p>
+            <a:pPr marL="0" indent="0">
+              <a:buNone/>
             </a:pPr>
-            <a:r>
-              <a:rPr lang="en-US" sz="2000" dirty="0"/>
-              <a:t>Create a yellow car.  Move the yellow car forward two units, turn left, move forward one space. </a:t>
-            </a:r>
-          </a:p>
-          <a:p>
-            <a:pPr marL="857250" lvl="1" indent="-457200">
-              <a:buAutoNum type="arabicPeriod"/>
+            <a:endParaRPr lang="en-US" dirty="0">
+              <a:latin typeface="Courier New" panose="02070309020205020404" pitchFamily="49" charset="0"/>
+              <a:cs typeface="Courier New" panose="02070309020205020404" pitchFamily="49" charset="0"/>
+            </a:endParaRPr>
+          </a:p>
+          <a:p>
+            <a:pPr marL="0" indent="0">
+              <a:buNone/>
             </a:pPr>
-            <a:r>
-              <a:rPr lang="en-US" sz="2000" dirty="0"/>
-              <a:t>Create a green car.  Turn left.  Move forward one space.  Turn right.  Move forward two spaces. </a:t>
-            </a:r>
-          </a:p>
-          <a:p>
-            <a:pPr marL="857250" lvl="1" indent="-457200">
-              <a:buAutoNum type="arabicPeriod"/>
+            <a:endParaRPr lang="en-US" dirty="0">
+              <a:latin typeface="+mj-lt"/>
+              <a:cs typeface="Courier New" panose="02070309020205020404" pitchFamily="49" charset="0"/>
+            </a:endParaRPr>
+          </a:p>
+          <a:p>
+            <a:pPr marL="0" indent="0">
+              <a:buNone/>
             </a:pPr>
             <a:r>
-              <a:rPr lang="en-US" sz="2000" dirty="0"/>
-              <a:t>Print both cars.  </a:t>
-            </a:r>
-          </a:p>
-          <a:p>
-            <a:pPr marL="457200" indent="-457200">
-              <a:buAutoNum type="arabicPeriod"/>
+              <a:rPr lang="en-US" dirty="0">
+                <a:latin typeface="+mj-lt"/>
+                <a:cs typeface="Courier New" panose="02070309020205020404" pitchFamily="49" charset="0"/>
+              </a:rPr>
+              <a:t>Why is that at the end of the script? </a:t>
+            </a:r>
+          </a:p>
+          <a:p>
+            <a:pPr marL="0" indent="0">
+              <a:buNone/>
             </a:pPr>
-            <a:endParaRPr lang="en-US" sz="2400" dirty="0"/>
-          </a:p>
-          <a:p>
-            <a:pPr marL="0" indent="0">
-              <a:buNone/>
-            </a:pPr>
-            <a:endParaRPr lang="en-US" sz="2400" dirty="0"/>
+            <a:endParaRPr lang="en-US" dirty="0">
+              <a:latin typeface="Courier New" panose="02070309020205020404" pitchFamily="49" charset="0"/>
+              <a:cs typeface="Courier New" panose="02070309020205020404" pitchFamily="49" charset="0"/>
+            </a:endParaRPr>
           </a:p>
         </p:txBody>
       </p:sp>
@@ -5030,6 +4882,702 @@
               <a:rPr lang="en-GB" smtClean="0"/>
               <a:pPr algn="ctr"/>
               <a:t>12</a:t>
+            </a:fld>
+            <a:endParaRPr lang="en-GB" dirty="0"/>
+          </a:p>
+        </p:txBody>
+      </p:sp>
+    </p:spTree>
+    <p:extLst>
+      <p:ext uri="{BB962C8B-B14F-4D97-AF65-F5344CB8AC3E}">
+        <p14:creationId xmlns:p14="http://schemas.microsoft.com/office/powerpoint/2010/main" val="3388580841"/>
+      </p:ext>
+    </p:extLst>
+  </p:cSld>
+  <p:clrMapOvr>
+    <a:masterClrMapping/>
+  </p:clrMapOvr>
+</p:sld>
+</file>
+
+<file path=ppt/slides/slide13.xml><?xml version="1.0" encoding="utf-8"?>
+<p:sld xmlns:a="http://schemas.openxmlformats.org/drawingml/2006/main" xmlns:r="http://schemas.openxmlformats.org/officeDocument/2006/relationships" xmlns:p="http://schemas.openxmlformats.org/presentationml/2006/main">
+  <p:cSld>
+    <p:spTree>
+      <p:nvGrpSpPr>
+        <p:cNvPr id="1" name=""/>
+        <p:cNvGrpSpPr/>
+        <p:nvPr/>
+      </p:nvGrpSpPr>
+      <p:grpSpPr>
+        <a:xfrm>
+          <a:off x="0" y="0"/>
+          <a:ext cx="0" cy="0"/>
+          <a:chOff x="0" y="0"/>
+          <a:chExt cx="0" cy="0"/>
+        </a:xfrm>
+      </p:grpSpPr>
+      <p:sp>
+        <p:nvSpPr>
+          <p:cNvPr id="2" name="Title 1"/>
+          <p:cNvSpPr>
+            <a:spLocks noGrp="1"/>
+          </p:cNvSpPr>
+          <p:nvPr>
+            <p:ph type="title"/>
+          </p:nvPr>
+        </p:nvSpPr>
+        <p:spPr/>
+        <p:txBody>
+          <a:bodyPr/>
+          <a:lstStyle/>
+          <a:p>
+            <a:r>
+              <a:rPr lang="en-US" dirty="0"/>
+              <a:t>Running at a command prompt</a:t>
+            </a:r>
+          </a:p>
+        </p:txBody>
+      </p:sp>
+      <p:sp>
+        <p:nvSpPr>
+          <p:cNvPr id="3" name="Content Placeholder 2"/>
+          <p:cNvSpPr>
+            <a:spLocks noGrp="1"/>
+          </p:cNvSpPr>
+          <p:nvPr>
+            <p:ph idx="1"/>
+          </p:nvPr>
+        </p:nvSpPr>
+        <p:spPr/>
+        <p:txBody>
+          <a:bodyPr/>
+          <a:lstStyle/>
+          <a:p>
+            <a:pPr marL="0" indent="0">
+              <a:buNone/>
+            </a:pPr>
+            <a:endParaRPr lang="en-US" dirty="0">
+              <a:cs typeface="Courier New" panose="02070309020205020404" pitchFamily="49" charset="0"/>
+            </a:endParaRPr>
+          </a:p>
+          <a:p>
+            <a:pPr marL="0" indent="0">
+              <a:buNone/>
+            </a:pPr>
+            <a:r>
+              <a:rPr lang="en-US" dirty="0">
+                <a:cs typeface="Courier New" panose="02070309020205020404" pitchFamily="49" charset="0"/>
+              </a:rPr>
+              <a:t>Passing command line arguments: </a:t>
+            </a:r>
+          </a:p>
+          <a:p>
+            <a:pPr marL="0" indent="0">
+              <a:buNone/>
+            </a:pPr>
+            <a:r>
+              <a:rPr lang="en-US" dirty="0">
+                <a:latin typeface="Courier New" panose="02070309020205020404" pitchFamily="49" charset="0"/>
+                <a:cs typeface="Courier New" panose="02070309020205020404" pitchFamily="49" charset="0"/>
+              </a:rPr>
+              <a:t>python &lt;</a:t>
+            </a:r>
+            <a:r>
+              <a:rPr lang="en-US" dirty="0" err="1">
+                <a:latin typeface="Courier New" panose="02070309020205020404" pitchFamily="49" charset="0"/>
+                <a:cs typeface="Courier New" panose="02070309020205020404" pitchFamily="49" charset="0"/>
+              </a:rPr>
+              <a:t>script_name</a:t>
+            </a:r>
+            <a:r>
+              <a:rPr lang="en-US" dirty="0">
+                <a:latin typeface="Courier New" panose="02070309020205020404" pitchFamily="49" charset="0"/>
+                <a:cs typeface="Courier New" panose="02070309020205020404" pitchFamily="49" charset="0"/>
+              </a:rPr>
+              <a:t>&gt; &lt;arg1&gt;</a:t>
+            </a:r>
+          </a:p>
+          <a:p>
+            <a:pPr marL="0" indent="0">
+              <a:buNone/>
+            </a:pPr>
+            <a:endParaRPr lang="en-US" dirty="0"/>
+          </a:p>
+          <a:p>
+            <a:pPr marL="0" indent="0">
+              <a:buNone/>
+            </a:pPr>
+            <a:r>
+              <a:rPr lang="en-US" dirty="0"/>
+              <a:t>i.e. </a:t>
+            </a:r>
+          </a:p>
+          <a:p>
+            <a:pPr marL="0" indent="0">
+              <a:buNone/>
+            </a:pPr>
+            <a:r>
+              <a:rPr lang="en-US" dirty="0">
+                <a:latin typeface="Courier New" panose="02070309020205020404" pitchFamily="49" charset="0"/>
+                <a:cs typeface="Courier New" panose="02070309020205020404" pitchFamily="49" charset="0"/>
+              </a:rPr>
+              <a:t>python point1.py 2</a:t>
+            </a:r>
+          </a:p>
+          <a:p>
+            <a:pPr marL="0" indent="0">
+              <a:buNone/>
+            </a:pPr>
+            <a:endParaRPr lang="en-US" dirty="0">
+              <a:latin typeface="Courier New" panose="02070309020205020404" pitchFamily="49" charset="0"/>
+              <a:cs typeface="Courier New" panose="02070309020205020404" pitchFamily="49" charset="0"/>
+            </a:endParaRPr>
+          </a:p>
+          <a:p>
+            <a:pPr marL="0" indent="0">
+              <a:buNone/>
+            </a:pPr>
+            <a:endParaRPr lang="en-US" dirty="0">
+              <a:latin typeface="Courier New" panose="02070309020205020404" pitchFamily="49" charset="0"/>
+              <a:cs typeface="Courier New" panose="02070309020205020404" pitchFamily="49" charset="0"/>
+            </a:endParaRPr>
+          </a:p>
+          <a:p>
+            <a:pPr marL="0" indent="0">
+              <a:buNone/>
+            </a:pPr>
+            <a:endParaRPr lang="en-US" dirty="0">
+              <a:latin typeface="Courier New" panose="02070309020205020404" pitchFamily="49" charset="0"/>
+              <a:cs typeface="Courier New" panose="02070309020205020404" pitchFamily="49" charset="0"/>
+            </a:endParaRPr>
+          </a:p>
+        </p:txBody>
+      </p:sp>
+      <p:sp>
+        <p:nvSpPr>
+          <p:cNvPr id="4" name="Slide Number Placeholder 3"/>
+          <p:cNvSpPr>
+            <a:spLocks noGrp="1"/>
+          </p:cNvSpPr>
+          <p:nvPr>
+            <p:ph type="sldNum" sz="quarter" idx="10"/>
+          </p:nvPr>
+        </p:nvSpPr>
+        <p:spPr/>
+        <p:txBody>
+          <a:bodyPr/>
+          <a:lstStyle/>
+          <a:p>
+            <a:pPr algn="ctr"/>
+            <a:fld id="{DB5A3A47-29A7-45E5-923E-10FF85749154}" type="slidenum">
+              <a:rPr lang="en-GB" smtClean="0"/>
+              <a:pPr algn="ctr"/>
+              <a:t>13</a:t>
+            </a:fld>
+            <a:endParaRPr lang="en-GB" dirty="0"/>
+          </a:p>
+        </p:txBody>
+      </p:sp>
+    </p:spTree>
+    <p:extLst>
+      <p:ext uri="{BB962C8B-B14F-4D97-AF65-F5344CB8AC3E}">
+        <p14:creationId xmlns:p14="http://schemas.microsoft.com/office/powerpoint/2010/main" val="2907436876"/>
+      </p:ext>
+    </p:extLst>
+  </p:cSld>
+  <p:clrMapOvr>
+    <a:masterClrMapping/>
+  </p:clrMapOvr>
+</p:sld>
+</file>
+
+<file path=ppt/slides/slide14.xml><?xml version="1.0" encoding="utf-8"?>
+<p:sld xmlns:a="http://schemas.openxmlformats.org/drawingml/2006/main" xmlns:r="http://schemas.openxmlformats.org/officeDocument/2006/relationships" xmlns:p="http://schemas.openxmlformats.org/presentationml/2006/main">
+  <p:cSld>
+    <p:spTree>
+      <p:nvGrpSpPr>
+        <p:cNvPr id="1" name=""/>
+        <p:cNvGrpSpPr/>
+        <p:nvPr/>
+      </p:nvGrpSpPr>
+      <p:grpSpPr>
+        <a:xfrm>
+          <a:off x="0" y="0"/>
+          <a:ext cx="0" cy="0"/>
+          <a:chOff x="0" y="0"/>
+          <a:chExt cx="0" cy="0"/>
+        </a:xfrm>
+      </p:grpSpPr>
+      <p:sp>
+        <p:nvSpPr>
+          <p:cNvPr id="2" name="Title 1"/>
+          <p:cNvSpPr>
+            <a:spLocks noGrp="1"/>
+          </p:cNvSpPr>
+          <p:nvPr>
+            <p:ph type="title"/>
+          </p:nvPr>
+        </p:nvSpPr>
+        <p:spPr/>
+        <p:txBody>
+          <a:bodyPr/>
+          <a:lstStyle/>
+          <a:p>
+            <a:r>
+              <a:rPr lang="en-US" dirty="0"/>
+              <a:t>Some Examples</a:t>
+            </a:r>
+          </a:p>
+        </p:txBody>
+      </p:sp>
+      <p:sp>
+        <p:nvSpPr>
+          <p:cNvPr id="3" name="Content Placeholder 2"/>
+          <p:cNvSpPr>
+            <a:spLocks noGrp="1"/>
+          </p:cNvSpPr>
+          <p:nvPr>
+            <p:ph idx="1"/>
+          </p:nvPr>
+        </p:nvSpPr>
+        <p:spPr>
+          <a:xfrm>
+            <a:off x="330200" y="1538790"/>
+            <a:ext cx="8489950" cy="4798510"/>
+          </a:xfrm>
+        </p:spPr>
+        <p:txBody>
+          <a:bodyPr/>
+          <a:lstStyle/>
+          <a:p>
+            <a:pPr marL="0" indent="0">
+              <a:buNone/>
+            </a:pPr>
+            <a:r>
+              <a:rPr lang="en-US" dirty="0"/>
+              <a:t>DTA (Dynamic Traffic Assignment) Anyway</a:t>
+            </a:r>
+          </a:p>
+          <a:p>
+            <a:pPr marL="0" indent="0">
+              <a:buNone/>
+            </a:pPr>
+            <a:r>
+              <a:rPr lang="en-US" dirty="0">
+                <a:hlinkClick r:id="rId2"/>
+              </a:rPr>
+              <a:t>https://github.com/sfcta/dta</a:t>
+            </a:r>
+            <a:endParaRPr lang="en-US" dirty="0"/>
+          </a:p>
+          <a:p>
+            <a:pPr marL="0" indent="0">
+              <a:buNone/>
+            </a:pPr>
+            <a:endParaRPr lang="en-US" dirty="0"/>
+          </a:p>
+          <a:p>
+            <a:pPr marL="0" indent="0">
+              <a:buNone/>
+            </a:pPr>
+            <a:r>
+              <a:rPr lang="en-US" dirty="0" err="1"/>
+              <a:t>UrbanSim</a:t>
+            </a:r>
+            <a:endParaRPr lang="en-US" dirty="0"/>
+          </a:p>
+          <a:p>
+            <a:pPr marL="0" indent="0">
+              <a:buNone/>
+            </a:pPr>
+            <a:r>
+              <a:rPr lang="en-US" dirty="0">
+                <a:hlinkClick r:id="rId3"/>
+              </a:rPr>
+              <a:t>https://github.com/UDST/urbansim</a:t>
+            </a:r>
+            <a:r>
+              <a:rPr lang="en-US" dirty="0"/>
+              <a:t> </a:t>
+            </a:r>
+          </a:p>
+          <a:p>
+            <a:pPr marL="0" indent="0">
+              <a:buNone/>
+            </a:pPr>
+            <a:endParaRPr lang="en-US" dirty="0"/>
+          </a:p>
+          <a:p>
+            <a:pPr marL="0" indent="0">
+              <a:buNone/>
+            </a:pPr>
+            <a:r>
+              <a:rPr lang="en-US" dirty="0" err="1"/>
+              <a:t>ActivitySim</a:t>
+            </a:r>
+            <a:endParaRPr lang="en-US" dirty="0"/>
+          </a:p>
+          <a:p>
+            <a:pPr marL="0" indent="0">
+              <a:buNone/>
+            </a:pPr>
+            <a:r>
+              <a:rPr lang="en-US" dirty="0">
+                <a:hlinkClick r:id="rId4"/>
+              </a:rPr>
+              <a:t>https://github.com/ActivitySim/activitysim</a:t>
+            </a:r>
+            <a:r>
+              <a:rPr lang="en-US" dirty="0"/>
+              <a:t> </a:t>
+            </a:r>
+          </a:p>
+        </p:txBody>
+      </p:sp>
+      <p:sp>
+        <p:nvSpPr>
+          <p:cNvPr id="4" name="Slide Number Placeholder 3"/>
+          <p:cNvSpPr>
+            <a:spLocks noGrp="1"/>
+          </p:cNvSpPr>
+          <p:nvPr>
+            <p:ph type="sldNum" sz="quarter" idx="10"/>
+          </p:nvPr>
+        </p:nvSpPr>
+        <p:spPr/>
+        <p:txBody>
+          <a:bodyPr/>
+          <a:lstStyle/>
+          <a:p>
+            <a:pPr algn="ctr"/>
+            <a:fld id="{DB5A3A47-29A7-45E5-923E-10FF85749154}" type="slidenum">
+              <a:rPr lang="en-GB" smtClean="0"/>
+              <a:pPr algn="ctr"/>
+              <a:t>14</a:t>
+            </a:fld>
+            <a:endParaRPr lang="en-GB" dirty="0"/>
+          </a:p>
+        </p:txBody>
+      </p:sp>
+    </p:spTree>
+    <p:extLst>
+      <p:ext uri="{BB962C8B-B14F-4D97-AF65-F5344CB8AC3E}">
+        <p14:creationId xmlns:p14="http://schemas.microsoft.com/office/powerpoint/2010/main" val="3643902399"/>
+      </p:ext>
+    </p:extLst>
+  </p:cSld>
+  <p:clrMapOvr>
+    <a:masterClrMapping/>
+  </p:clrMapOvr>
+</p:sld>
+</file>
+
+<file path=ppt/slides/slide15.xml><?xml version="1.0" encoding="utf-8"?>
+<p:sld xmlns:a="http://schemas.openxmlformats.org/drawingml/2006/main" xmlns:r="http://schemas.openxmlformats.org/officeDocument/2006/relationships" xmlns:p="http://schemas.openxmlformats.org/presentationml/2006/main">
+  <p:cSld>
+    <p:spTree>
+      <p:nvGrpSpPr>
+        <p:cNvPr id="1" name=""/>
+        <p:cNvGrpSpPr/>
+        <p:nvPr/>
+      </p:nvGrpSpPr>
+      <p:grpSpPr>
+        <a:xfrm>
+          <a:off x="0" y="0"/>
+          <a:ext cx="0" cy="0"/>
+          <a:chOff x="0" y="0"/>
+          <a:chExt cx="0" cy="0"/>
+        </a:xfrm>
+      </p:grpSpPr>
+      <p:sp>
+        <p:nvSpPr>
+          <p:cNvPr id="2" name="Title 1"/>
+          <p:cNvSpPr>
+            <a:spLocks noGrp="1"/>
+          </p:cNvSpPr>
+          <p:nvPr>
+            <p:ph type="title"/>
+          </p:nvPr>
+        </p:nvSpPr>
+        <p:spPr/>
+        <p:txBody>
+          <a:bodyPr/>
+          <a:lstStyle/>
+          <a:p>
+            <a:r>
+              <a:rPr lang="en-US" dirty="0"/>
+              <a:t>Homework</a:t>
+            </a:r>
+          </a:p>
+        </p:txBody>
+      </p:sp>
+      <p:sp>
+        <p:nvSpPr>
+          <p:cNvPr id="3" name="Content Placeholder 2"/>
+          <p:cNvSpPr>
+            <a:spLocks noGrp="1"/>
+          </p:cNvSpPr>
+          <p:nvPr>
+            <p:ph idx="1"/>
+          </p:nvPr>
+        </p:nvSpPr>
+        <p:spPr/>
+        <p:txBody>
+          <a:bodyPr/>
+          <a:lstStyle/>
+          <a:p>
+            <a:pPr marL="0" indent="0">
+              <a:buNone/>
+            </a:pPr>
+            <a:r>
+              <a:rPr lang="en-US" sz="2400" dirty="0"/>
+              <a:t>1. Read (and understand) chapters 15, 16 and 17 of Think Python: </a:t>
+            </a:r>
+          </a:p>
+          <a:p>
+            <a:pPr marL="0" indent="0">
+              <a:buNone/>
+            </a:pPr>
+            <a:r>
+              <a:rPr lang="en-US" sz="2400" dirty="0"/>
+              <a:t>	</a:t>
+            </a:r>
+            <a:r>
+              <a:rPr lang="en-US" sz="2400" dirty="0">
+                <a:hlinkClick r:id="rId2"/>
+              </a:rPr>
+              <a:t>http://greenteapress.com/thinkpython/thinkpython.pdf</a:t>
+            </a:r>
+            <a:endParaRPr lang="en-US" sz="2400" dirty="0"/>
+          </a:p>
+          <a:p>
+            <a:pPr marL="0" indent="0">
+              <a:buNone/>
+            </a:pPr>
+            <a:endParaRPr lang="en-US" sz="2400" dirty="0"/>
+          </a:p>
+          <a:p>
+            <a:pPr marL="0" indent="0">
+              <a:buNone/>
+            </a:pPr>
+            <a:r>
+              <a:rPr lang="en-US" sz="2400" dirty="0"/>
+              <a:t>2. Do the exercise on the next page. You can test your solution in a notebook, but should implement the final solution in scripts. </a:t>
+            </a:r>
+          </a:p>
+          <a:p>
+            <a:pPr marL="0" indent="0">
+              <a:buNone/>
+            </a:pPr>
+            <a:endParaRPr lang="en-US" sz="2400" dirty="0"/>
+          </a:p>
+        </p:txBody>
+      </p:sp>
+      <p:sp>
+        <p:nvSpPr>
+          <p:cNvPr id="4" name="Slide Number Placeholder 3"/>
+          <p:cNvSpPr>
+            <a:spLocks noGrp="1"/>
+          </p:cNvSpPr>
+          <p:nvPr>
+            <p:ph type="sldNum" sz="quarter" idx="10"/>
+          </p:nvPr>
+        </p:nvSpPr>
+        <p:spPr/>
+        <p:txBody>
+          <a:bodyPr/>
+          <a:lstStyle/>
+          <a:p>
+            <a:pPr algn="ctr"/>
+            <a:fld id="{DB5A3A47-29A7-45E5-923E-10FF85749154}" type="slidenum">
+              <a:rPr lang="en-GB" smtClean="0"/>
+              <a:pPr algn="ctr"/>
+              <a:t>15</a:t>
+            </a:fld>
+            <a:endParaRPr lang="en-GB" dirty="0"/>
+          </a:p>
+        </p:txBody>
+      </p:sp>
+    </p:spTree>
+    <p:extLst>
+      <p:ext uri="{BB962C8B-B14F-4D97-AF65-F5344CB8AC3E}">
+        <p14:creationId xmlns:p14="http://schemas.microsoft.com/office/powerpoint/2010/main" val="3924181066"/>
+      </p:ext>
+    </p:extLst>
+  </p:cSld>
+  <p:clrMapOvr>
+    <a:masterClrMapping/>
+  </p:clrMapOvr>
+</p:sld>
+</file>
+
+<file path=ppt/slides/slide16.xml><?xml version="1.0" encoding="utf-8"?>
+<p:sld xmlns:a="http://schemas.openxmlformats.org/drawingml/2006/main" xmlns:r="http://schemas.openxmlformats.org/officeDocument/2006/relationships" xmlns:p="http://schemas.openxmlformats.org/presentationml/2006/main">
+  <p:cSld>
+    <p:spTree>
+      <p:nvGrpSpPr>
+        <p:cNvPr id="1" name=""/>
+        <p:cNvGrpSpPr/>
+        <p:nvPr/>
+      </p:nvGrpSpPr>
+      <p:grpSpPr>
+        <a:xfrm>
+          <a:off x="0" y="0"/>
+          <a:ext cx="0" cy="0"/>
+          <a:chOff x="0" y="0"/>
+          <a:chExt cx="0" cy="0"/>
+        </a:xfrm>
+      </p:grpSpPr>
+      <p:sp>
+        <p:nvSpPr>
+          <p:cNvPr id="2" name="Title 1"/>
+          <p:cNvSpPr>
+            <a:spLocks noGrp="1"/>
+          </p:cNvSpPr>
+          <p:nvPr>
+            <p:ph type="title"/>
+          </p:nvPr>
+        </p:nvSpPr>
+        <p:spPr/>
+        <p:txBody>
+          <a:bodyPr/>
+          <a:lstStyle/>
+          <a:p>
+            <a:r>
+              <a:rPr lang="en-US" dirty="0"/>
+              <a:t>Homework</a:t>
+            </a:r>
+          </a:p>
+        </p:txBody>
+      </p:sp>
+      <p:sp>
+        <p:nvSpPr>
+          <p:cNvPr id="3" name="Content Placeholder 2"/>
+          <p:cNvSpPr>
+            <a:spLocks noGrp="1"/>
+          </p:cNvSpPr>
+          <p:nvPr>
+            <p:ph idx="1"/>
+          </p:nvPr>
+        </p:nvSpPr>
+        <p:spPr/>
+        <p:txBody>
+          <a:bodyPr/>
+          <a:lstStyle/>
+          <a:p>
+            <a:pPr marL="457200" indent="-457200">
+              <a:buAutoNum type="arabicPeriod"/>
+            </a:pPr>
+            <a:r>
+              <a:rPr lang="en-US" sz="2400" dirty="0"/>
+              <a:t>Create a class called car, with the attributes: color, location (x, y coordinates), and direction.  </a:t>
+            </a:r>
+          </a:p>
+          <a:p>
+            <a:pPr marL="457200" indent="-457200">
+              <a:buAutoNum type="arabicPeriod"/>
+            </a:pPr>
+            <a:r>
+              <a:rPr lang="en-US" sz="2400" dirty="0"/>
+              <a:t>Write methods for: go(), </a:t>
+            </a:r>
+            <a:r>
+              <a:rPr lang="en-US" sz="2400" dirty="0" err="1"/>
+              <a:t>turn_left</a:t>
+            </a:r>
+            <a:r>
+              <a:rPr lang="en-US" sz="2400" dirty="0"/>
+              <a:t>(), and </a:t>
+            </a:r>
+            <a:r>
+              <a:rPr lang="en-US" sz="2400" dirty="0" err="1"/>
+              <a:t>turn_right</a:t>
+            </a:r>
+            <a:r>
+              <a:rPr lang="en-US" sz="2400" dirty="0"/>
+              <a:t>(). </a:t>
+            </a:r>
+          </a:p>
+          <a:p>
+            <a:pPr marL="457200" indent="-457200">
+              <a:buAutoNum type="arabicPeriod"/>
+            </a:pPr>
+            <a:r>
+              <a:rPr lang="en-US" sz="2400" dirty="0"/>
+              <a:t>Add a print() method that prints the current attributes of the car. </a:t>
+            </a:r>
+          </a:p>
+          <a:p>
+            <a:pPr marL="457200" indent="-457200">
+              <a:buAutoNum type="arabicPeriod"/>
+            </a:pPr>
+            <a:r>
+              <a:rPr lang="en-US" sz="2400" dirty="0"/>
+              <a:t>Write a script to: </a:t>
+            </a:r>
+          </a:p>
+          <a:p>
+            <a:pPr marL="857250" lvl="1" indent="-457200">
+              <a:buAutoNum type="arabicPeriod"/>
+            </a:pPr>
+            <a:r>
+              <a:rPr lang="en-US" sz="2000" dirty="0"/>
+              <a:t>Create a yellow car.  Move the yellow car forward two units, turn left, move forward one space. </a:t>
+            </a:r>
+          </a:p>
+          <a:p>
+            <a:pPr marL="857250" lvl="1" indent="-457200">
+              <a:buAutoNum type="arabicPeriod"/>
+            </a:pPr>
+            <a:r>
+              <a:rPr lang="en-US" sz="2000" dirty="0"/>
+              <a:t>Create a green car.  Turn left.  Move forward one space.  Turn right.  Move forward two spaces. </a:t>
+            </a:r>
+          </a:p>
+          <a:p>
+            <a:pPr marL="857250" lvl="1" indent="-457200">
+              <a:buAutoNum type="arabicPeriod"/>
+            </a:pPr>
+            <a:r>
+              <a:rPr lang="en-US" sz="2000" dirty="0"/>
+              <a:t>Print both cars.  </a:t>
+            </a:r>
+          </a:p>
+          <a:p>
+            <a:pPr marL="457200" indent="-457200">
+              <a:buAutoNum type="arabicPeriod"/>
+            </a:pPr>
+            <a:endParaRPr lang="en-US" sz="2400" dirty="0"/>
+          </a:p>
+          <a:p>
+            <a:pPr marL="0" indent="0">
+              <a:buNone/>
+            </a:pPr>
+            <a:endParaRPr lang="en-US" sz="2400" dirty="0"/>
+          </a:p>
+        </p:txBody>
+      </p:sp>
+      <p:sp>
+        <p:nvSpPr>
+          <p:cNvPr id="4" name="Slide Number Placeholder 3"/>
+          <p:cNvSpPr>
+            <a:spLocks noGrp="1"/>
+          </p:cNvSpPr>
+          <p:nvPr>
+            <p:ph type="sldNum" sz="quarter" idx="10"/>
+          </p:nvPr>
+        </p:nvSpPr>
+        <p:spPr/>
+        <p:txBody>
+          <a:bodyPr/>
+          <a:lstStyle/>
+          <a:p>
+            <a:pPr algn="ctr"/>
+            <a:fld id="{DB5A3A47-29A7-45E5-923E-10FF85749154}" type="slidenum">
+              <a:rPr lang="en-GB" smtClean="0"/>
+              <a:pPr algn="ctr"/>
+              <a:t>16</a:t>
             </a:fld>
             <a:endParaRPr lang="en-GB" dirty="0"/>
           </a:p>
@@ -5180,6 +5728,64 @@
       </p:grpSpPr>
       <p:sp>
         <p:nvSpPr>
+          <p:cNvPr id="3" name="Text Placeholder 2">
+            <a:extLst>
+              <a:ext uri="{FF2B5EF4-FFF2-40B4-BE49-F238E27FC236}">
+                <a16:creationId xmlns:a16="http://schemas.microsoft.com/office/drawing/2014/main" id="{5CBCF9E9-8080-4E04-A577-2039AA9E58ED}"/>
+              </a:ext>
+            </a:extLst>
+          </p:cNvPr>
+          <p:cNvSpPr>
+            <a:spLocks noGrp="1"/>
+          </p:cNvSpPr>
+          <p:nvPr>
+            <p:ph type="body" sz="quarter" idx="10"/>
+          </p:nvPr>
+        </p:nvSpPr>
+        <p:spPr/>
+        <p:txBody>
+          <a:bodyPr/>
+          <a:lstStyle/>
+          <a:p>
+            <a:r>
+              <a:rPr lang="en-US" dirty="0"/>
+              <a:t>Big Picture</a:t>
+            </a:r>
+          </a:p>
+        </p:txBody>
+      </p:sp>
+    </p:spTree>
+    <p:extLst>
+      <p:ext uri="{BB962C8B-B14F-4D97-AF65-F5344CB8AC3E}">
+        <p14:creationId xmlns:p14="http://schemas.microsoft.com/office/powerpoint/2010/main" val="3361801223"/>
+      </p:ext>
+    </p:extLst>
+  </p:cSld>
+  <p:clrMapOvr>
+    <a:masterClrMapping/>
+  </p:clrMapOvr>
+</p:sld>
+</file>
+
+<file path=ppt/slides/slide3.xml><?xml version="1.0" encoding="utf-8"?>
+<p:sld xmlns:a="http://schemas.openxmlformats.org/drawingml/2006/main" xmlns:r="http://schemas.openxmlformats.org/officeDocument/2006/relationships" xmlns:p="http://schemas.openxmlformats.org/presentationml/2006/main">
+  <p:cSld>
+    <p:spTree>
+      <p:nvGrpSpPr>
+        <p:cNvPr id="1" name=""/>
+        <p:cNvGrpSpPr/>
+        <p:nvPr/>
+      </p:nvGrpSpPr>
+      <p:grpSpPr>
+        <a:xfrm>
+          <a:off x="0" y="0"/>
+          <a:ext cx="0" cy="0"/>
+          <a:chOff x="0" y="0"/>
+          <a:chExt cx="0" cy="0"/>
+        </a:xfrm>
+      </p:grpSpPr>
+      <p:sp>
+        <p:nvSpPr>
           <p:cNvPr id="2" name="Title 1"/>
           <p:cNvSpPr>
             <a:spLocks noGrp="1"/>
@@ -5247,7 +5853,7 @@
             <a:fld id="{DB5A3A47-29A7-45E5-923E-10FF85749154}" type="slidenum">
               <a:rPr lang="en-GB" smtClean="0"/>
               <a:pPr algn="ctr"/>
-              <a:t>2</a:t>
+              <a:t>3</a:t>
             </a:fld>
             <a:endParaRPr lang="en-GB" dirty="0"/>
           </a:p>
@@ -5266,7 +5872,7 @@
 </p:sld>
 </file>
 
-<file path=ppt/slides/slide3.xml><?xml version="1.0" encoding="utf-8"?>
+<file path=ppt/slides/slide4.xml><?xml version="1.0" encoding="utf-8"?>
 <p:sld xmlns:a="http://schemas.openxmlformats.org/drawingml/2006/main" xmlns:r="http://schemas.openxmlformats.org/officeDocument/2006/relationships" xmlns:p="http://schemas.openxmlformats.org/presentationml/2006/main">
   <p:cSld>
     <p:spTree>
@@ -5551,11 +6157,6 @@
               </a:rPr>
               <a:t>https://www.slideshare.net/HarisBinZahid/procedural-vs-object-oriented-programming</a:t>
             </a:r>
-            <a:endParaRPr lang="en-US" sz="1200" dirty="0">
-              <a:solidFill>
-                <a:schemeClr val="bg2"/>
-              </a:solidFill>
-            </a:endParaRPr>
           </a:p>
         </p:txBody>
       </p:sp>
@@ -5563,168 +6164,6 @@
     <p:extLst>
       <p:ext uri="{BB962C8B-B14F-4D97-AF65-F5344CB8AC3E}">
         <p14:creationId xmlns:p14="http://schemas.microsoft.com/office/powerpoint/2010/main" val="1905160257"/>
-      </p:ext>
-    </p:extLst>
-  </p:cSld>
-  <p:clrMapOvr>
-    <a:masterClrMapping/>
-  </p:clrMapOvr>
-</p:sld>
-</file>
-
-<file path=ppt/slides/slide4.xml><?xml version="1.0" encoding="utf-8"?>
-<p:sld xmlns:a="http://schemas.openxmlformats.org/drawingml/2006/main" xmlns:r="http://schemas.openxmlformats.org/officeDocument/2006/relationships" xmlns:p="http://schemas.openxmlformats.org/presentationml/2006/main">
-  <p:cSld>
-    <p:spTree>
-      <p:nvGrpSpPr>
-        <p:cNvPr id="1" name=""/>
-        <p:cNvGrpSpPr/>
-        <p:nvPr/>
-      </p:nvGrpSpPr>
-      <p:grpSpPr>
-        <a:xfrm>
-          <a:off x="0" y="0"/>
-          <a:ext cx="0" cy="0"/>
-          <a:chOff x="0" y="0"/>
-          <a:chExt cx="0" cy="0"/>
-        </a:xfrm>
-      </p:grpSpPr>
-      <p:sp>
-        <p:nvSpPr>
-          <p:cNvPr id="2" name="Title 1"/>
-          <p:cNvSpPr>
-            <a:spLocks noGrp="1"/>
-          </p:cNvSpPr>
-          <p:nvPr>
-            <p:ph type="title"/>
-          </p:nvPr>
-        </p:nvSpPr>
-        <p:spPr/>
-        <p:txBody>
-          <a:bodyPr>
-            <a:normAutofit fontScale="90000"/>
-          </a:bodyPr>
-          <a:lstStyle/>
-          <a:p>
-            <a:r>
-              <a:rPr lang="en-US" b="1" dirty="0"/>
-              <a:t>Procedure Oriented Programming</a:t>
-            </a:r>
-            <a:br>
-              <a:rPr lang="en-US" b="1" dirty="0"/>
-            </a:br>
-            <a:endParaRPr lang="en-US" dirty="0"/>
-          </a:p>
-        </p:txBody>
-      </p:sp>
-      <p:sp>
-        <p:nvSpPr>
-          <p:cNvPr id="3" name="Content Placeholder 2"/>
-          <p:cNvSpPr>
-            <a:spLocks noGrp="1"/>
-          </p:cNvSpPr>
-          <p:nvPr>
-            <p:ph idx="1"/>
-          </p:nvPr>
-        </p:nvSpPr>
-        <p:spPr/>
-        <p:txBody>
-          <a:bodyPr>
-            <a:normAutofit lnSpcReduction="10000"/>
-          </a:bodyPr>
-          <a:lstStyle/>
-          <a:p>
-            <a:r>
-              <a:rPr lang="en-US" dirty="0"/>
-              <a:t>It means “</a:t>
-            </a:r>
-            <a:r>
-              <a:rPr lang="en-US" b="1" i="1" dirty="0"/>
-              <a:t>a set of procedures</a:t>
-            </a:r>
-            <a:r>
-              <a:rPr lang="en-US" dirty="0"/>
-              <a:t>” which is a “</a:t>
-            </a:r>
-            <a:r>
-              <a:rPr lang="en-US" b="1" i="1" dirty="0"/>
-              <a:t>set of subroutines</a:t>
-            </a:r>
-            <a:r>
-              <a:rPr lang="en-US" dirty="0"/>
-              <a:t>” or a “</a:t>
-            </a:r>
-            <a:r>
-              <a:rPr lang="en-US" b="1" i="1" dirty="0"/>
-              <a:t>set of functions</a:t>
-            </a:r>
-            <a:r>
-              <a:rPr lang="en-US" dirty="0"/>
-              <a:t>“.</a:t>
-            </a:r>
-          </a:p>
-          <a:p>
-            <a:r>
-              <a:rPr lang="en-US" dirty="0"/>
-              <a:t>functions are called repeatedly in a program to execute tasks performed by them. For </a:t>
-            </a:r>
-            <a:r>
-              <a:rPr lang="en-US" dirty="0">
-                <a:solidFill>
-                  <a:srgbClr val="00B050"/>
-                </a:solidFill>
-              </a:rPr>
-              <a:t>example</a:t>
-            </a:r>
-            <a:r>
-              <a:rPr lang="en-US" dirty="0"/>
-              <a:t>, a program may involve collecting data from user (reading), performing some kind of calculations on the collected data (calculation), and finally displaying the result to the user when requested (printing). All the 3 tasks of reading, calculating and printing can be written in a program with the help of 3 different functions which performs these 3 different tasks. </a:t>
-            </a:r>
-          </a:p>
-        </p:txBody>
-      </p:sp>
-      <p:sp>
-        <p:nvSpPr>
-          <p:cNvPr id="4" name="TextBox 3"/>
-          <p:cNvSpPr txBox="1"/>
-          <p:nvPr/>
-        </p:nvSpPr>
-        <p:spPr>
-          <a:xfrm>
-            <a:off x="431540" y="6219310"/>
-            <a:ext cx="8280920" cy="276999"/>
-          </a:xfrm>
-          <a:prstGeom prst="rect">
-            <a:avLst/>
-          </a:prstGeom>
-          <a:noFill/>
-        </p:spPr>
-        <p:txBody>
-          <a:bodyPr wrap="square" rtlCol="0">
-            <a:spAutoFit/>
-          </a:bodyPr>
-          <a:lstStyle/>
-          <a:p>
-            <a:r>
-              <a:rPr lang="en-US" sz="1200" dirty="0">
-                <a:solidFill>
-                  <a:schemeClr val="bg2"/>
-                </a:solidFill>
-              </a:rPr>
-              <a:t>https://www.slideshare.net/HarisBinZahid/procedural-vs-object-oriented-programming</a:t>
-            </a:r>
-            <a:endParaRPr lang="en-US" sz="1200" dirty="0">
-              <a:solidFill>
-                <a:schemeClr val="bg2"/>
-              </a:solidFill>
-            </a:endParaRPr>
-          </a:p>
-        </p:txBody>
-      </p:sp>
-    </p:spTree>
-    <p:extLst>
-      <p:ext uri="{BB962C8B-B14F-4D97-AF65-F5344CB8AC3E}">
-        <p14:creationId xmlns:p14="http://schemas.microsoft.com/office/powerpoint/2010/main" val="2844145086"/>
       </p:ext>
     </p:extLst>
   </p:cSld>
@@ -5753,87 +6192,101 @@
       </p:grpSpPr>
       <p:sp>
         <p:nvSpPr>
-          <p:cNvPr id="2" name="Rectangle 1"/>
-          <p:cNvSpPr/>
-          <p:nvPr/>
-        </p:nvSpPr>
-        <p:spPr>
-          <a:xfrm>
-            <a:off x="533400" y="838201"/>
-            <a:ext cx="7543800" cy="4524315"/>
-          </a:xfrm>
-          <a:prstGeom prst="rect">
-            <a:avLst/>
-          </a:prstGeom>
-        </p:spPr>
-        <p:txBody>
-          <a:bodyPr wrap="square">
-            <a:spAutoFit/>
+          <p:cNvPr id="2" name="Title 1"/>
+          <p:cNvSpPr>
+            <a:spLocks noGrp="1"/>
+          </p:cNvSpPr>
+          <p:nvPr>
+            <p:ph type="title"/>
+          </p:nvPr>
+        </p:nvSpPr>
+        <p:spPr/>
+        <p:txBody>
+          <a:bodyPr>
+            <a:normAutofit fontScale="90000"/>
           </a:bodyPr>
           <a:lstStyle/>
           <a:p>
             <a:r>
-              <a:rPr lang="en-US" sz="3200" b="1" u="sng" dirty="0"/>
-              <a:t>Object Oriented Methodology </a:t>
-            </a:r>
-            <a:r>
-              <a:rPr lang="en-US" sz="3200" dirty="0"/>
-              <a:t>is a certain </a:t>
-            </a:r>
-            <a:r>
-              <a:rPr lang="en-US" sz="3200" b="1" dirty="0"/>
-              <a:t>process</a:t>
-            </a:r>
-            <a:r>
-              <a:rPr lang="en-US" sz="3200" dirty="0"/>
-              <a:t> through which software can be developed. The </a:t>
-            </a:r>
-            <a:r>
-              <a:rPr lang="en-US" sz="3200" b="1" dirty="0"/>
-              <a:t>goals</a:t>
-            </a:r>
-            <a:r>
-              <a:rPr lang="en-US" sz="3200" dirty="0"/>
-              <a:t> of this methodology are to achieve Software Systems that are </a:t>
-            </a:r>
-            <a:r>
-              <a:rPr lang="en-US" sz="3200" b="1" dirty="0"/>
-              <a:t>reliable</a:t>
-            </a:r>
-            <a:r>
-              <a:rPr lang="en-US" sz="3200" dirty="0"/>
-              <a:t>, </a:t>
-            </a:r>
-            <a:r>
-              <a:rPr lang="en-US" sz="3200" b="1" dirty="0"/>
-              <a:t>reusable</a:t>
-            </a:r>
-            <a:r>
-              <a:rPr lang="en-US" sz="3200" dirty="0"/>
-              <a:t>, </a:t>
-            </a:r>
-            <a:r>
-              <a:rPr lang="en-US" sz="3200" b="1" dirty="0"/>
-              <a:t>extensible</a:t>
-            </a:r>
-            <a:r>
-              <a:rPr lang="en-US" sz="3200" dirty="0"/>
-              <a:t>; hence, more useful in the long run. The methodology achieves its goals by the help of a </a:t>
-            </a:r>
-            <a:r>
-              <a:rPr lang="en-US" sz="3200" i="1" dirty="0"/>
-              <a:t>collection of objects that communicate by exchanging messages</a:t>
-            </a:r>
-            <a:r>
-              <a:rPr lang="en-US" sz="3200" dirty="0"/>
-              <a:t>.</a:t>
-            </a:r>
-          </a:p>
-        </p:txBody>
-      </p:sp>
-      <p:sp>
-        <p:nvSpPr>
-          <p:cNvPr id="3" name="TextBox 2"/>
+              <a:rPr lang="en-US" b="1" dirty="0"/>
+              <a:t>Procedure Oriented Programming</a:t>
+            </a:r>
+            <a:br>
+              <a:rPr lang="en-US" b="1" dirty="0"/>
+            </a:br>
+            <a:endParaRPr lang="en-US" dirty="0"/>
+          </a:p>
+        </p:txBody>
+      </p:sp>
+      <p:sp>
+        <p:nvSpPr>
+          <p:cNvPr id="3" name="Content Placeholder 2"/>
+          <p:cNvSpPr>
+            <a:spLocks noGrp="1"/>
+          </p:cNvSpPr>
+          <p:nvPr>
+            <p:ph idx="1"/>
+          </p:nvPr>
+        </p:nvSpPr>
+        <p:spPr/>
+        <p:txBody>
+          <a:bodyPr>
+            <a:normAutofit lnSpcReduction="10000"/>
+          </a:bodyPr>
+          <a:lstStyle/>
+          <a:p>
+            <a:r>
+              <a:rPr lang="en-US" dirty="0"/>
+              <a:t>It means “</a:t>
+            </a:r>
+            <a:r>
+              <a:rPr lang="en-US" b="1" i="1" dirty="0"/>
+              <a:t>a set of procedures</a:t>
+            </a:r>
+            <a:r>
+              <a:rPr lang="en-US" dirty="0"/>
+              <a:t>” which is a “</a:t>
+            </a:r>
+            <a:r>
+              <a:rPr lang="en-US" b="1" i="1" dirty="0"/>
+              <a:t>set of subroutines</a:t>
+            </a:r>
+            <a:r>
+              <a:rPr lang="en-US" dirty="0"/>
+              <a:t>” or a “</a:t>
+            </a:r>
+            <a:r>
+              <a:rPr lang="en-US" b="1" i="1" dirty="0"/>
+              <a:t>set of functions</a:t>
+            </a:r>
+            <a:r>
+              <a:rPr lang="en-US" dirty="0"/>
+              <a:t>“.</a:t>
+            </a:r>
+          </a:p>
+          <a:p>
+            <a:r>
+              <a:rPr lang="en-US" dirty="0"/>
+              <a:t>functions are called repeatedly in a program to execute tasks performed by them. For </a:t>
+            </a:r>
+            <a:r>
+              <a:rPr lang="en-US" dirty="0">
+                <a:solidFill>
+                  <a:srgbClr val="00B050"/>
+                </a:solidFill>
+              </a:rPr>
+              <a:t>example</a:t>
+            </a:r>
+            <a:r>
+              <a:rPr lang="en-US" dirty="0"/>
+              <a:t>, a program may involve collecting data from user (reading), performing some kind of calculations on the collected data (calculation), and finally displaying the result to the user when requested (printing). All the 3 tasks of reading, calculating and printing can be written in a program with the help of 3 different functions which performs these 3 different tasks. </a:t>
+            </a:r>
+          </a:p>
+        </p:txBody>
+      </p:sp>
+      <p:sp>
+        <p:nvSpPr>
+          <p:cNvPr id="4" name="TextBox 3"/>
           <p:cNvSpPr txBox="1"/>
           <p:nvPr/>
         </p:nvSpPr>
@@ -5861,11 +6314,149 @@
               </a:rPr>
               <a:t>https://www.slideshare.net/HarisBinZahid/procedural-vs-object-oriented-programming</a:t>
             </a:r>
-            <a:endParaRPr lang="en-US" sz="1200" dirty="0">
-              <a:solidFill>
-                <a:schemeClr val="bg2"/>
-              </a:solidFill>
-            </a:endParaRPr>
+          </a:p>
+        </p:txBody>
+      </p:sp>
+    </p:spTree>
+    <p:extLst>
+      <p:ext uri="{BB962C8B-B14F-4D97-AF65-F5344CB8AC3E}">
+        <p14:creationId xmlns:p14="http://schemas.microsoft.com/office/powerpoint/2010/main" val="2844145086"/>
+      </p:ext>
+    </p:extLst>
+  </p:cSld>
+  <p:clrMapOvr>
+    <a:masterClrMapping/>
+  </p:clrMapOvr>
+</p:sld>
+</file>
+
+<file path=ppt/slides/slide6.xml><?xml version="1.0" encoding="utf-8"?>
+<p:sld xmlns:a="http://schemas.openxmlformats.org/drawingml/2006/main" xmlns:r="http://schemas.openxmlformats.org/officeDocument/2006/relationships" xmlns:p="http://schemas.openxmlformats.org/presentationml/2006/main">
+  <p:cSld>
+    <p:spTree>
+      <p:nvGrpSpPr>
+        <p:cNvPr id="1" name=""/>
+        <p:cNvGrpSpPr/>
+        <p:nvPr/>
+      </p:nvGrpSpPr>
+      <p:grpSpPr>
+        <a:xfrm>
+          <a:off x="0" y="0"/>
+          <a:ext cx="0" cy="0"/>
+          <a:chOff x="0" y="0"/>
+          <a:chExt cx="0" cy="0"/>
+        </a:xfrm>
+      </p:grpSpPr>
+      <p:sp>
+        <p:nvSpPr>
+          <p:cNvPr id="2" name="Rectangle 1"/>
+          <p:cNvSpPr/>
+          <p:nvPr/>
+        </p:nvSpPr>
+        <p:spPr>
+          <a:xfrm>
+            <a:off x="533400" y="838201"/>
+            <a:ext cx="7543800" cy="4524315"/>
+          </a:xfrm>
+          <a:prstGeom prst="rect">
+            <a:avLst/>
+          </a:prstGeom>
+        </p:spPr>
+        <p:txBody>
+          <a:bodyPr wrap="square">
+            <a:spAutoFit/>
+          </a:bodyPr>
+          <a:lstStyle/>
+          <a:p>
+            <a:r>
+              <a:rPr lang="en-US" sz="3200" b="1" u="sng" dirty="0"/>
+              <a:t>Object Oriented Methodology </a:t>
+            </a:r>
+            <a:r>
+              <a:rPr lang="en-US" sz="3200" dirty="0"/>
+              <a:t>is a certain </a:t>
+            </a:r>
+            <a:r>
+              <a:rPr lang="en-US" sz="3200" b="1" dirty="0"/>
+              <a:t>process</a:t>
+            </a:r>
+            <a:r>
+              <a:rPr lang="en-US" sz="3200" dirty="0"/>
+              <a:t> through which software can be developed. The </a:t>
+            </a:r>
+            <a:r>
+              <a:rPr lang="en-US" sz="3200" b="1" dirty="0"/>
+              <a:t>goals</a:t>
+            </a:r>
+            <a:r>
+              <a:rPr lang="en-US" sz="3200" dirty="0"/>
+              <a:t> of this methodology are to achieve Software Systems that are </a:t>
+            </a:r>
+            <a:r>
+              <a:rPr lang="en-US" sz="3200" b="1" dirty="0"/>
+              <a:t>reliable</a:t>
+            </a:r>
+            <a:r>
+              <a:rPr lang="en-US" sz="3200" dirty="0"/>
+              <a:t>, </a:t>
+            </a:r>
+            <a:r>
+              <a:rPr lang="en-US" sz="3200" b="1" dirty="0"/>
+              <a:t>reusable</a:t>
+            </a:r>
+            <a:r>
+              <a:rPr lang="en-US" sz="3200" dirty="0"/>
+              <a:t>, </a:t>
+            </a:r>
+            <a:r>
+              <a:rPr lang="en-US" sz="3200" b="1" dirty="0"/>
+              <a:t>extensible</a:t>
+            </a:r>
+            <a:r>
+              <a:rPr lang="en-US" sz="3200" dirty="0"/>
+              <a:t>; hence, more useful in the long run. The methodology achieves its goals by the help of a </a:t>
+            </a:r>
+            <a:r>
+              <a:rPr lang="en-US" sz="3200" i="1" dirty="0"/>
+              <a:t>collection of objects that communicate by exchanging messages</a:t>
+            </a:r>
+            <a:r>
+              <a:rPr lang="en-US" sz="3200" dirty="0"/>
+              <a:t>.</a:t>
+            </a:r>
+          </a:p>
+        </p:txBody>
+      </p:sp>
+      <p:sp>
+        <p:nvSpPr>
+          <p:cNvPr id="3" name="TextBox 2"/>
+          <p:cNvSpPr txBox="1"/>
+          <p:nvPr/>
+        </p:nvSpPr>
+        <p:spPr>
+          <a:xfrm>
+            <a:off x="431540" y="6219310"/>
+            <a:ext cx="8280920" cy="276999"/>
+          </a:xfrm>
+          <a:prstGeom prst="rect">
+            <a:avLst/>
+          </a:prstGeom>
+          <a:noFill/>
+        </p:spPr>
+        <p:txBody>
+          <a:bodyPr wrap="square" rtlCol="0">
+            <a:spAutoFit/>
+          </a:bodyPr>
+          <a:lstStyle/>
+          <a:p>
+            <a:r>
+              <a:rPr lang="en-US" sz="1200" dirty="0">
+                <a:solidFill>
+                  <a:schemeClr val="bg2"/>
+                </a:solidFill>
+              </a:rPr>
+              <a:t>https://www.slideshare.net/HarisBinZahid/procedural-vs-object-oriented-programming</a:t>
+            </a:r>
           </a:p>
         </p:txBody>
       </p:sp>
@@ -5882,7 +6473,7 @@
 </p:sld>
 </file>
 
-<file path=ppt/slides/slide6.xml><?xml version="1.0" encoding="utf-8"?>
+<file path=ppt/slides/slide7.xml><?xml version="1.0" encoding="utf-8"?>
 <p:sld xmlns:a="http://schemas.openxmlformats.org/drawingml/2006/main" xmlns:r="http://schemas.openxmlformats.org/officeDocument/2006/relationships" xmlns:p="http://schemas.openxmlformats.org/presentationml/2006/main">
   <p:cSld>
     <p:spTree>
@@ -6272,11 +6863,6 @@
               </a:rPr>
               <a:t>https://www.slideshare.net/HarisBinZahid/procedural-vs-object-oriented-programming</a:t>
             </a:r>
-            <a:endParaRPr lang="en-US" sz="1200" dirty="0">
-              <a:solidFill>
-                <a:schemeClr val="bg2"/>
-              </a:solidFill>
-            </a:endParaRPr>
           </a:p>
         </p:txBody>
       </p:sp>
@@ -6293,7 +6879,7 @@
 </p:sld>
 </file>
 
-<file path=ppt/slides/slide7.xml><?xml version="1.0" encoding="utf-8"?>
+<file path=ppt/slides/slide8.xml><?xml version="1.0" encoding="utf-8"?>
 <p:sld xmlns:a="http://schemas.openxmlformats.org/drawingml/2006/main" xmlns:r="http://schemas.openxmlformats.org/officeDocument/2006/relationships" xmlns:p="http://schemas.openxmlformats.org/presentationml/2006/main">
   <p:cSld>
     <p:spTree>
@@ -6470,11 +7056,6 @@
               </a:rPr>
               <a:t>https://www.slideshare.net/HarisBinZahid/procedural-vs-object-oriented-programming</a:t>
             </a:r>
-            <a:endParaRPr lang="en-US" sz="1200" dirty="0">
-              <a:solidFill>
-                <a:schemeClr val="bg2"/>
-              </a:solidFill>
-            </a:endParaRPr>
           </a:p>
         </p:txBody>
       </p:sp>
@@ -6492,7 +7073,7 @@
 </p:sld>
 </file>
 
-<file path=ppt/slides/slide8.xml><?xml version="1.0" encoding="utf-8"?>
+<file path=ppt/slides/slide9.xml><?xml version="1.0" encoding="utf-8"?>
 <p:sld xmlns:a="http://schemas.openxmlformats.org/drawingml/2006/main" xmlns:r="http://schemas.openxmlformats.org/officeDocument/2006/relationships" xmlns:p="http://schemas.openxmlformats.org/presentationml/2006/main">
   <p:cSld>
     <p:spTree>
@@ -6717,11 +7298,6 @@
               </a:rPr>
               <a:t>https://www.slideshare.net/HarisBinZahid/procedural-vs-object-oriented-programming</a:t>
             </a:r>
-            <a:endParaRPr lang="en-US" sz="1200" dirty="0">
-              <a:solidFill>
-                <a:schemeClr val="bg2"/>
-              </a:solidFill>
-            </a:endParaRPr>
           </a:p>
         </p:txBody>
       </p:sp>
@@ -6729,137 +7305,6 @@
     <p:extLst>
       <p:ext uri="{BB962C8B-B14F-4D97-AF65-F5344CB8AC3E}">
         <p14:creationId xmlns:p14="http://schemas.microsoft.com/office/powerpoint/2010/main" val="1288337914"/>
-      </p:ext>
-    </p:extLst>
-  </p:cSld>
-  <p:clrMapOvr>
-    <a:masterClrMapping/>
-  </p:clrMapOvr>
-</p:sld>
-</file>
-
-<file path=ppt/slides/slide9.xml><?xml version="1.0" encoding="utf-8"?>
-<p:sld xmlns:a="http://schemas.openxmlformats.org/drawingml/2006/main" xmlns:r="http://schemas.openxmlformats.org/officeDocument/2006/relationships" xmlns:p="http://schemas.openxmlformats.org/presentationml/2006/main">
-  <p:cSld>
-    <p:spTree>
-      <p:nvGrpSpPr>
-        <p:cNvPr id="1" name=""/>
-        <p:cNvGrpSpPr/>
-        <p:nvPr/>
-      </p:nvGrpSpPr>
-      <p:grpSpPr>
-        <a:xfrm>
-          <a:off x="0" y="0"/>
-          <a:ext cx="0" cy="0"/>
-          <a:chOff x="0" y="0"/>
-          <a:chExt cx="0" cy="0"/>
-        </a:xfrm>
-      </p:grpSpPr>
-      <p:sp>
-        <p:nvSpPr>
-          <p:cNvPr id="2" name="Title 1"/>
-          <p:cNvSpPr>
-            <a:spLocks noGrp="1"/>
-          </p:cNvSpPr>
-          <p:nvPr>
-            <p:ph type="title"/>
-          </p:nvPr>
-        </p:nvSpPr>
-        <p:spPr/>
-        <p:txBody>
-          <a:bodyPr/>
-          <a:lstStyle/>
-          <a:p>
-            <a:r>
-              <a:rPr lang="en-US" dirty="0"/>
-              <a:t>An Example</a:t>
-            </a:r>
-          </a:p>
-        </p:txBody>
-      </p:sp>
-      <p:sp>
-        <p:nvSpPr>
-          <p:cNvPr id="3" name="Content Placeholder 2"/>
-          <p:cNvSpPr>
-            <a:spLocks noGrp="1"/>
-          </p:cNvSpPr>
-          <p:nvPr>
-            <p:ph idx="1"/>
-          </p:nvPr>
-        </p:nvSpPr>
-        <p:spPr>
-          <a:xfrm>
-            <a:off x="330200" y="1538790"/>
-            <a:ext cx="8489950" cy="4798510"/>
-          </a:xfrm>
-        </p:spPr>
-        <p:txBody>
-          <a:bodyPr/>
-          <a:lstStyle/>
-          <a:p>
-            <a:pPr marL="0" indent="0">
-              <a:buNone/>
-            </a:pPr>
-            <a:r>
-              <a:rPr lang="en-US" dirty="0"/>
-              <a:t>DTA (Dynamic Traffic Assignment) Anyway</a:t>
-            </a:r>
-          </a:p>
-          <a:p>
-            <a:pPr marL="0" indent="0">
-              <a:buNone/>
-            </a:pPr>
-            <a:endParaRPr lang="en-US" dirty="0"/>
-          </a:p>
-          <a:p>
-            <a:pPr marL="0" indent="0">
-              <a:buNone/>
-            </a:pPr>
-            <a:r>
-              <a:rPr lang="en-US" dirty="0">
-                <a:hlinkClick r:id="rId2"/>
-              </a:rPr>
-              <a:t>https://github.com/sfcta/dta</a:t>
-            </a:r>
-            <a:endParaRPr lang="en-US" dirty="0"/>
-          </a:p>
-          <a:p>
-            <a:pPr marL="0" indent="0">
-              <a:buNone/>
-            </a:pPr>
-            <a:endParaRPr lang="en-US" dirty="0"/>
-          </a:p>
-        </p:txBody>
-      </p:sp>
-      <p:sp>
-        <p:nvSpPr>
-          <p:cNvPr id="4" name="Slide Number Placeholder 3"/>
-          <p:cNvSpPr>
-            <a:spLocks noGrp="1"/>
-          </p:cNvSpPr>
-          <p:nvPr>
-            <p:ph type="sldNum" sz="quarter" idx="10"/>
-          </p:nvPr>
-        </p:nvSpPr>
-        <p:spPr/>
-        <p:txBody>
-          <a:bodyPr/>
-          <a:lstStyle/>
-          <a:p>
-            <a:pPr algn="ctr"/>
-            <a:fld id="{DB5A3A47-29A7-45E5-923E-10FF85749154}" type="slidenum">
-              <a:rPr lang="en-GB" smtClean="0"/>
-              <a:pPr algn="ctr"/>
-              <a:t>9</a:t>
-            </a:fld>
-            <a:endParaRPr lang="en-GB" dirty="0"/>
-          </a:p>
-        </p:txBody>
-      </p:sp>
-    </p:spTree>
-    <p:extLst>
-      <p:ext uri="{BB962C8B-B14F-4D97-AF65-F5344CB8AC3E}">
-        <p14:creationId xmlns:p14="http://schemas.microsoft.com/office/powerpoint/2010/main" val="3643902399"/>
       </p:ext>
     </p:extLst>
   </p:cSld>

</xml_diff>